<commit_message>
add tank color, add hit system
</commit_message>
<xml_diff>
--- a/docs/2차 발표.pptx
+++ b/docs/2차 발표.pptx
@@ -3736,7 +3736,7 @@
           <p:nvPr>
             <p:extLst>
               <p:ext uri="{D42A27DB-BD31-4B8C-83A1-F6EECF244321}">
-                <p14:modId xmlns:p14="http://schemas.microsoft.com/office/powerpoint/2010/main" val="1740251472"/>
+                <p14:modId xmlns:p14="http://schemas.microsoft.com/office/powerpoint/2010/main" val="3891532258"/>
               </p:ext>
             </p:extLst>
           </p:nvPr>
@@ -6467,7 +6467,7 @@
                           <a:ea typeface="맑은 고딕" panose="020B0503020000020004" pitchFamily="50" charset="-127"/>
                           <a:cs typeface="+mn-cs"/>
                         </a:rPr>
-                        <a:t>10%</a:t>
+                        <a:t>90%</a:t>
                       </a:r>
                       <a:endParaRPr kumimoji="0" lang="ko-KR" altLang="en-US" sz="1400" b="1" i="0" u="none" strike="noStrike" kern="1200" cap="none" spc="0" normalizeH="0" baseline="0" noProof="0" dirty="0">
                         <a:ln>
@@ -7089,6 +7089,23 @@
                         <a:tabLst/>
                         <a:defRPr/>
                       </a:pPr>
+                      <a:r>
+                        <a:rPr kumimoji="0" lang="en-US" altLang="ko-KR" sz="1400" b="1" i="0" u="none" strike="noStrike" kern="1200" cap="none" spc="0" normalizeH="0" baseline="0" noProof="0">
+                          <a:ln>
+                            <a:noFill/>
+                          </a:ln>
+                          <a:solidFill>
+                            <a:prstClr val="black"/>
+                          </a:solidFill>
+                          <a:effectLst/>
+                          <a:uLnTx/>
+                          <a:uFillTx/>
+                          <a:latin typeface="맑은 고딕" panose="020F0502020204030204"/>
+                          <a:ea typeface="맑은 고딕" panose="020B0503020000020004" pitchFamily="50" charset="-127"/>
+                          <a:cs typeface="+mn-cs"/>
+                        </a:rPr>
+                        <a:t>10%</a:t>
+                      </a:r>
                       <a:endParaRPr kumimoji="0" lang="en-US" altLang="ko-KR" sz="1400" b="1" i="0" u="none" strike="noStrike" kern="1200" cap="none" spc="0" normalizeH="0" baseline="0" noProof="0" dirty="0">
                         <a:ln>
                           <a:noFill/>

</xml_diff>

<commit_message>
add tank collision for shells
</commit_message>
<xml_diff>
--- a/docs/2차 발표.pptx
+++ b/docs/2차 발표.pptx
@@ -4729,7 +4729,7 @@
                         <a:t>2. </a:t>
                       </a:r>
                       <a:r>
-                        <a:rPr kumimoji="0" lang="ko-KR" altLang="en-US" sz="1400" b="1" i="0" u="none" strike="noStrike" kern="1200" cap="none" spc="0" normalizeH="0" baseline="0" noProof="0" dirty="0" err="1">
+                        <a:rPr kumimoji="0" lang="ko-KR" altLang="en-US" sz="1400" b="1" i="0" u="none" strike="noStrike" kern="1200" cap="none" spc="0" normalizeH="0" baseline="0" noProof="0" dirty="0">
                           <a:ln>
                             <a:noFill/>
                           </a:ln>
@@ -4743,24 +4743,7 @@
                           <a:ea typeface="맑은 고딕" panose="020B0503020000020004" pitchFamily="50" charset="-127"/>
                           <a:cs typeface="+mn-cs"/>
                         </a:rPr>
-                        <a:t>선형보간을</a:t>
-                      </a:r>
-                      <a:r>
-                        <a:rPr kumimoji="0" lang="ko-KR" altLang="en-US" sz="1400" b="1" i="0" u="none" strike="noStrike" kern="1200" cap="none" spc="0" normalizeH="0" baseline="0" noProof="0" dirty="0">
-                          <a:ln>
-                            <a:noFill/>
-                          </a:ln>
-                          <a:solidFill>
-                            <a:prstClr val="black"/>
-                          </a:solidFill>
-                          <a:effectLst/>
-                          <a:uLnTx/>
-                          <a:uFillTx/>
-                          <a:latin typeface="맑은 고딕" panose="020F0502020204030204"/>
-                          <a:ea typeface="맑은 고딕" panose="020B0503020000020004" pitchFamily="50" charset="-127"/>
-                          <a:cs typeface="+mn-cs"/>
-                        </a:rPr>
-                        <a:t> 이용한 부드러운 포탄 움직임</a:t>
+                        <a:t>선형보간을 이용한 부드러운 포탄 움직임</a:t>
                       </a:r>
                       <a:endParaRPr kumimoji="0" lang="en-US" altLang="ko-KR" sz="1400" b="1" i="0" u="none" strike="noStrike" kern="1200" cap="none" spc="0" normalizeH="0" baseline="0" noProof="0" dirty="0">
                         <a:ln>
@@ -5164,7 +5147,7 @@
                         <a:t>/ </a:t>
                       </a:r>
                       <a:r>
-                        <a:rPr kumimoji="0" lang="ko-KR" altLang="en-US" sz="1400" b="1" i="0" u="none" strike="noStrike" kern="1200" cap="none" spc="0" normalizeH="0" baseline="0" noProof="0" dirty="0" err="1">
+                        <a:rPr kumimoji="0" lang="ko-KR" altLang="en-US" sz="1400" b="1" i="0" u="none" strike="noStrike" kern="1200" cap="none" spc="0" normalizeH="0" baseline="0" noProof="0" dirty="0">
                           <a:ln>
                             <a:noFill/>
                           </a:ln>
@@ -5178,24 +5161,7 @@
                           <a:ea typeface="+mn-ea"/>
                           <a:cs typeface="+mn-cs"/>
                         </a:rPr>
-                        <a:t>고폭탄</a:t>
-                      </a:r>
-                      <a:r>
-                        <a:rPr kumimoji="0" lang="ko-KR" altLang="en-US" sz="1400" b="1" i="0" u="none" strike="noStrike" kern="1200" cap="none" spc="0" normalizeH="0" baseline="0" noProof="0" dirty="0">
-                          <a:ln>
-                            <a:noFill/>
-                          </a:ln>
-                          <a:solidFill>
-                            <a:prstClr val="black"/>
-                          </a:solidFill>
-                          <a:effectLst/>
-                          <a:uLnTx/>
-                          <a:uFillTx/>
-                          <a:latin typeface="+mn-lt"/>
-                          <a:ea typeface="+mn-ea"/>
-                          <a:cs typeface="+mn-cs"/>
-                        </a:rPr>
-                        <a:t> </a:t>
+                        <a:t>고폭탄 </a:t>
                       </a:r>
                       <a:r>
                         <a:rPr kumimoji="0" lang="en-US" altLang="ko-KR" sz="1400" b="1" i="0" u="none" strike="noStrike" kern="1200" cap="none" spc="0" normalizeH="0" baseline="0" noProof="0" dirty="0">
@@ -5650,24 +5616,7 @@
                           <a:ea typeface="+mn-ea"/>
                           <a:cs typeface="+mn-cs"/>
                         </a:rPr>
-                        <a:t>랜덤하게 바람을 생성하고 그에 따라 </a:t>
-                      </a:r>
-                      <a:r>
-                        <a:rPr kumimoji="0" lang="ko-KR" altLang="en-US" sz="1400" b="1" i="0" u="none" strike="noStrike" kern="1200" cap="none" spc="0" normalizeH="0" baseline="0" noProof="0" dirty="0" err="1">
-                          <a:ln>
-                            <a:noFill/>
-                          </a:ln>
-                          <a:solidFill>
-                            <a:prstClr val="black"/>
-                          </a:solidFill>
-                          <a:effectLst/>
-                          <a:uLnTx/>
-                          <a:uFillTx/>
-                          <a:latin typeface="+mn-lt"/>
-                          <a:ea typeface="+mn-ea"/>
-                          <a:cs typeface="+mn-cs"/>
-                        </a:rPr>
-                        <a:t>파티클</a:t>
+                        <a:t>랜덤하게 바람을 생성하고 그에 따라 파티클</a:t>
                       </a:r>
                       <a:r>
                         <a:rPr kumimoji="0" lang="en-US" altLang="ko-KR" sz="1400" b="1" i="0" u="none" strike="noStrike" kern="1200" cap="none" spc="0" normalizeH="0" baseline="0" noProof="0" dirty="0">
@@ -6347,41 +6296,7 @@
                           <a:ea typeface="맑은 고딕" panose="020B0503020000020004" pitchFamily="50" charset="-127"/>
                           <a:cs typeface="+mn-cs"/>
                         </a:rPr>
-                        <a:t>공격이 끝나거나 턴을 넘기면서 </a:t>
-                      </a:r>
-                      <a:r>
-                        <a:rPr kumimoji="0" lang="ko-KR" altLang="en-US" sz="1400" b="1" i="0" u="none" strike="noStrike" kern="1200" cap="none" spc="0" normalizeH="0" baseline="0" noProof="0" dirty="0" err="1">
-                          <a:ln>
-                            <a:noFill/>
-                          </a:ln>
-                          <a:solidFill>
-                            <a:prstClr val="black"/>
-                          </a:solidFill>
-                          <a:effectLst/>
-                          <a:uLnTx/>
-                          <a:uFillTx/>
-                          <a:latin typeface="맑은 고딕" panose="020F0502020204030204"/>
-                          <a:ea typeface="맑은 고딕" panose="020B0503020000020004" pitchFamily="50" charset="-127"/>
-                          <a:cs typeface="+mn-cs"/>
-                        </a:rPr>
-                        <a:t>번갈아가며</a:t>
-                      </a:r>
-                      <a:r>
-                        <a:rPr kumimoji="0" lang="ko-KR" altLang="en-US" sz="1400" b="1" i="0" u="none" strike="noStrike" kern="1200" cap="none" spc="0" normalizeH="0" baseline="0" noProof="0" dirty="0">
-                          <a:ln>
-                            <a:noFill/>
-                          </a:ln>
-                          <a:solidFill>
-                            <a:prstClr val="black"/>
-                          </a:solidFill>
-                          <a:effectLst/>
-                          <a:uLnTx/>
-                          <a:uFillTx/>
-                          <a:latin typeface="맑은 고딕" panose="020F0502020204030204"/>
-                          <a:ea typeface="맑은 고딕" panose="020B0503020000020004" pitchFamily="50" charset="-127"/>
-                          <a:cs typeface="+mn-cs"/>
-                        </a:rPr>
-                        <a:t> 턴을 진행하는 것을 구현</a:t>
+                        <a:t>공격이 끝나거나 턴을 넘기면서 번갈아가며 턴을 진행하는 것을 구현</a:t>
                       </a:r>
                     </a:p>
                   </a:txBody>
@@ -6819,41 +6734,7 @@
                           <a:ea typeface="맑은 고딕" panose="020B0503020000020004" pitchFamily="50" charset="-127"/>
                           <a:cs typeface="+mn-cs"/>
                         </a:rPr>
-                        <a:t>제작된 </a:t>
-                      </a:r>
-                      <a:r>
-                        <a:rPr kumimoji="0" lang="ko-KR" altLang="en-US" sz="1400" b="1" i="0" u="none" strike="noStrike" kern="1200" cap="none" spc="0" normalizeH="0" baseline="0" noProof="0" dirty="0" err="1">
-                          <a:ln>
-                            <a:noFill/>
-                          </a:ln>
-                          <a:solidFill>
-                            <a:prstClr val="black"/>
-                          </a:solidFill>
-                          <a:effectLst/>
-                          <a:uLnTx/>
-                          <a:uFillTx/>
-                          <a:latin typeface="맑은 고딕" panose="020F0502020204030204"/>
-                          <a:ea typeface="맑은 고딕" panose="020B0503020000020004" pitchFamily="50" charset="-127"/>
-                          <a:cs typeface="+mn-cs"/>
-                        </a:rPr>
-                        <a:t>맵의</a:t>
-                      </a:r>
-                      <a:r>
-                        <a:rPr kumimoji="0" lang="ko-KR" altLang="en-US" sz="1400" b="1" i="0" u="none" strike="noStrike" kern="1200" cap="none" spc="0" normalizeH="0" baseline="0" noProof="0" dirty="0">
-                          <a:ln>
-                            <a:noFill/>
-                          </a:ln>
-                          <a:solidFill>
-                            <a:prstClr val="black"/>
-                          </a:solidFill>
-                          <a:effectLst/>
-                          <a:uLnTx/>
-                          <a:uFillTx/>
-                          <a:latin typeface="맑은 고딕" panose="020F0502020204030204"/>
-                          <a:ea typeface="맑은 고딕" panose="020B0503020000020004" pitchFamily="50" charset="-127"/>
-                          <a:cs typeface="+mn-cs"/>
-                        </a:rPr>
-                        <a:t> 고정된 위치에 소환</a:t>
+                        <a:t>제작된 맵의 고정된 위치에 소환</a:t>
                       </a:r>
                       <a:endParaRPr kumimoji="0" lang="en-US" altLang="ko-KR" sz="1400" b="1" i="0" u="none" strike="noStrike" kern="1200" cap="none" spc="0" normalizeH="0" baseline="0" noProof="0" dirty="0">
                         <a:ln>
@@ -7768,41 +7649,7 @@
                           <a:ea typeface="+mn-ea"/>
                           <a:cs typeface="+mn-cs"/>
                         </a:rPr>
-                        <a:t>) / </a:t>
-                      </a:r>
-                      <a:r>
-                        <a:rPr kumimoji="0" lang="en-US" altLang="ko-KR" sz="1400" b="1" i="0" u="none" strike="noStrike" kern="1200" cap="none" spc="0" normalizeH="0" baseline="0" noProof="0" dirty="0" err="1">
-                          <a:ln>
-                            <a:noFill/>
-                          </a:ln>
-                          <a:solidFill>
-                            <a:prstClr val="black"/>
-                          </a:solidFill>
-                          <a:effectLst/>
-                          <a:uLnTx/>
-                          <a:uFillTx/>
-                          <a:latin typeface="+mn-lt"/>
-                          <a:ea typeface="+mn-ea"/>
-                          <a:cs typeface="+mn-cs"/>
-                        </a:rPr>
-                        <a:t>PvE</a:t>
-                      </a:r>
-                      <a:r>
-                        <a:rPr kumimoji="0" lang="en-US" altLang="ko-KR" sz="1400" b="1" i="0" u="none" strike="noStrike" kern="1200" cap="none" spc="0" normalizeH="0" baseline="0" noProof="0" dirty="0">
-                          <a:ln>
-                            <a:noFill/>
-                          </a:ln>
-                          <a:solidFill>
-                            <a:prstClr val="black"/>
-                          </a:solidFill>
-                          <a:effectLst/>
-                          <a:uLnTx/>
-                          <a:uFillTx/>
-                          <a:latin typeface="+mn-lt"/>
-                          <a:ea typeface="+mn-ea"/>
-                          <a:cs typeface="+mn-cs"/>
-                        </a:rPr>
-                        <a:t>(1</a:t>
+                        <a:t>) / PvE(1</a:t>
                       </a:r>
                       <a:r>
                         <a:rPr kumimoji="0" lang="ko-KR" altLang="en-US" sz="1400" b="1" i="0" u="none" strike="noStrike" kern="1200" cap="none" spc="0" normalizeH="0" baseline="0" noProof="0" dirty="0">
@@ -8208,7 +8055,7 @@
                         <a:t>/ </a:t>
                       </a:r>
                       <a:r>
-                        <a:rPr kumimoji="0" lang="ko-KR" altLang="en-US" sz="1400" b="1" i="0" u="none" strike="noStrike" kern="1200" cap="none" spc="0" normalizeH="0" baseline="0" noProof="0" dirty="0" err="1">
+                        <a:rPr kumimoji="0" lang="ko-KR" altLang="en-US" sz="1400" b="1" i="0" u="none" strike="noStrike" kern="1200" cap="none" spc="0" normalizeH="0" baseline="0" noProof="0" dirty="0">
                           <a:ln>
                             <a:noFill/>
                           </a:ln>
@@ -9399,6 +9246,58 @@
           </a:graphicData>
         </a:graphic>
       </p:graphicFrame>
+      <p:sp>
+        <p:nvSpPr>
+          <p:cNvPr id="2" name="TextBox 1">
+            <a:extLst>
+              <a:ext uri="{FF2B5EF4-FFF2-40B4-BE49-F238E27FC236}">
+                <a16:creationId xmlns:a16="http://schemas.microsoft.com/office/drawing/2014/main" id="{316022AF-33D8-8921-0B59-C8B47EEA1315}"/>
+              </a:ext>
+            </a:extLst>
+          </p:cNvPr>
+          <p:cNvSpPr txBox="1"/>
+          <p:nvPr/>
+        </p:nvSpPr>
+        <p:spPr>
+          <a:xfrm>
+            <a:off x="10659292" y="78377"/>
+            <a:ext cx="1338828" cy="369332"/>
+          </a:xfrm>
+          <a:prstGeom prst="rect">
+            <a:avLst/>
+          </a:prstGeom>
+          <a:noFill/>
+        </p:spPr>
+        <p:txBody>
+          <a:bodyPr wrap="none" rtlCol="0">
+            <a:spAutoFit/>
+          </a:bodyPr>
+          <a:lstStyle/>
+          <a:p>
+            <a:r>
+              <a:rPr lang="ko-KR" altLang="en-US" b="1" dirty="0">
+                <a:solidFill>
+                  <a:srgbClr val="FF0000"/>
+                </a:solidFill>
+              </a:rPr>
+              <a:t>평균 </a:t>
+            </a:r>
+            <a:r>
+              <a:rPr lang="en-US" altLang="ko-KR" b="1" dirty="0">
+                <a:solidFill>
+                  <a:srgbClr val="FF0000"/>
+                </a:solidFill>
+              </a:rPr>
+              <a:t>: 50%</a:t>
+            </a:r>
+            <a:endParaRPr lang="ko-KR" altLang="en-US" b="1" dirty="0">
+              <a:solidFill>
+                <a:srgbClr val="FF0000"/>
+              </a:solidFill>
+            </a:endParaRPr>
+          </a:p>
+        </p:txBody>
+      </p:sp>
     </p:spTree>
     <p:extLst>
       <p:ext uri="{BB962C8B-B14F-4D97-AF65-F5344CB8AC3E}">
@@ -9489,6 +9388,36 @@
           </a:p>
         </p:txBody>
       </p:sp>
+      <p:pic>
+        <p:nvPicPr>
+          <p:cNvPr id="3" name="그림 2">
+            <a:extLst>
+              <a:ext uri="{FF2B5EF4-FFF2-40B4-BE49-F238E27FC236}">
+                <a16:creationId xmlns:a16="http://schemas.microsoft.com/office/drawing/2014/main" id="{844A0BCD-5A88-A5AE-B61D-480C6784C31E}"/>
+              </a:ext>
+            </a:extLst>
+          </p:cNvPr>
+          <p:cNvPicPr>
+            <a:picLocks noChangeAspect="1"/>
+          </p:cNvPicPr>
+          <p:nvPr/>
+        </p:nvPicPr>
+        <p:blipFill>
+          <a:blip r:embed="rId2"/>
+          <a:stretch>
+            <a:fillRect/>
+          </a:stretch>
+        </p:blipFill>
+        <p:spPr>
+          <a:xfrm>
+            <a:off x="223801" y="543524"/>
+            <a:ext cx="11446115" cy="6173799"/>
+          </a:xfrm>
+          <a:prstGeom prst="rect">
+            <a:avLst/>
+          </a:prstGeom>
+        </p:spPr>
+      </p:pic>
     </p:spTree>
     <p:extLst>
       <p:ext uri="{BB962C8B-B14F-4D97-AF65-F5344CB8AC3E}">

</xml_diff>